<commit_message>
worked on fantasy nba page
</commit_message>
<xml_diff>
--- a/static/blueprints.pptx
+++ b/static/blueprints.pptx
@@ -7,6 +7,8 @@
   <p:sldIdLst>
     <p:sldId id="256" r:id="rId2"/>
     <p:sldId id="257" r:id="rId3"/>
+    <p:sldId id="258" r:id="rId4"/>
+    <p:sldId id="259" r:id="rId5"/>
   </p:sldIdLst>
   <p:sldSz cx="12192000" cy="6858000"/>
   <p:notesSz cx="6858000" cy="9144000"/>
@@ -3534,7 +3536,7 @@
                 <a:latin typeface="Arial" panose="020B0604020202020204" pitchFamily="34" charset="0"/>
                 <a:cs typeface="Arial" panose="020B0604020202020204" pitchFamily="34" charset="0"/>
               </a:rPr>
-              <a:t>Model Blueprint &amp; Data Pipeline</a:t>
+              <a:t>Project Blueprint &amp; Data Pipeline</a:t>
             </a:r>
           </a:p>
         </p:txBody>
@@ -4498,7 +4500,7 @@
         </p:blipFill>
         <p:spPr>
           <a:xfrm>
-            <a:off x="8339460" y="2722924"/>
+            <a:off x="8176528" y="2650438"/>
             <a:ext cx="700275" cy="316659"/>
           </a:xfrm>
           <a:prstGeom prst="rect">
@@ -4535,7 +4537,7 @@
         </p:blipFill>
         <p:spPr bwMode="auto">
           <a:xfrm>
-            <a:off x="8460787" y="3359311"/>
+            <a:off x="8366000" y="3429366"/>
             <a:ext cx="457627" cy="402555"/>
           </a:xfrm>
           <a:prstGeom prst="rect">
@@ -5041,6 +5043,53 @@
           </a:p>
         </p:txBody>
       </p:sp>
+      <p:pic>
+        <p:nvPicPr>
+          <p:cNvPr id="1048" name="Picture 4" descr="javascript logo png, javascript icon transparent png 27127560 PNG">
+            <a:extLst>
+              <a:ext uri="{FF2B5EF4-FFF2-40B4-BE49-F238E27FC236}">
+                <a16:creationId xmlns:a16="http://schemas.microsoft.com/office/drawing/2014/main" id="{B0AC4981-1374-E364-9910-20C55C654683}"/>
+              </a:ext>
+            </a:extLst>
+          </p:cNvPr>
+          <p:cNvPicPr>
+            <a:picLocks noChangeAspect="1" noChangeArrowheads="1"/>
+          </p:cNvPicPr>
+          <p:nvPr/>
+        </p:nvPicPr>
+        <p:blipFill>
+          <a:blip r:embed="rId10">
+            <a:extLst>
+              <a:ext uri="{28A0092B-C50C-407E-A947-70E740481C1C}">
+                <a14:useLocalDpi xmlns:a14="http://schemas.microsoft.com/office/drawing/2010/main" val="0"/>
+              </a:ext>
+            </a:extLst>
+          </a:blip>
+          <a:srcRect/>
+          <a:stretch>
+            <a:fillRect/>
+          </a:stretch>
+        </p:blipFill>
+        <p:spPr bwMode="auto">
+          <a:xfrm>
+            <a:off x="8687331" y="2918095"/>
+            <a:ext cx="577850" cy="577850"/>
+          </a:xfrm>
+          <a:prstGeom prst="rect">
+            <a:avLst/>
+          </a:prstGeom>
+          <a:noFill/>
+          <a:extLst>
+            <a:ext uri="{909E8E84-426E-40DD-AFC4-6F175D3DCCD1}">
+              <a14:hiddenFill xmlns:a14="http://schemas.microsoft.com/office/drawing/2010/main">
+                <a:solidFill>
+                  <a:srgbClr val="FFFFFF"/>
+                </a:solidFill>
+              </a14:hiddenFill>
+            </a:ext>
+          </a:extLst>
+        </p:spPr>
+      </p:pic>
     </p:spTree>
     <p:extLst>
       <p:ext uri="{BB962C8B-B14F-4D97-AF65-F5344CB8AC3E}">
@@ -5073,10 +5122,10 @@
       </p:grpSpPr>
       <p:sp>
         <p:nvSpPr>
-          <p:cNvPr id="6" name="Rectangle 5">
-            <a:extLst>
-              <a:ext uri="{FF2B5EF4-FFF2-40B4-BE49-F238E27FC236}">
-                <a16:creationId xmlns:a16="http://schemas.microsoft.com/office/drawing/2014/main" id="{D735A369-8FB3-305E-79AC-699A15C950A0}"/>
+          <p:cNvPr id="34" name="Rectangle 33">
+            <a:extLst>
+              <a:ext uri="{FF2B5EF4-FFF2-40B4-BE49-F238E27FC236}">
+                <a16:creationId xmlns:a16="http://schemas.microsoft.com/office/drawing/2014/main" id="{AB3604CC-F791-E5A9-3EA9-A6FDDB404B39}"/>
               </a:ext>
             </a:extLst>
           </p:cNvPr>
@@ -5085,8 +5134,8 @@
         </p:nvSpPr>
         <p:spPr>
           <a:xfrm>
-            <a:off x="230659" y="1151238"/>
-            <a:ext cx="11751276" cy="5574957"/>
+            <a:off x="8656141" y="1828242"/>
+            <a:ext cx="2347551" cy="3534589"/>
           </a:xfrm>
           <a:prstGeom prst="rect">
             <a:avLst/>
@@ -5137,7 +5186,7 @@
         </p:nvSpPr>
         <p:spPr>
           <a:xfrm>
-            <a:off x="446997" y="2539314"/>
+            <a:off x="1027266" y="2310744"/>
             <a:ext cx="1142945" cy="2500184"/>
           </a:xfrm>
           <a:prstGeom prst="rect">
@@ -5222,70 +5271,11 @@
                 <a:latin typeface="Arial" panose="020B0604020202020204" pitchFamily="34" charset="0"/>
                 <a:cs typeface="Arial" panose="020B0604020202020204" pitchFamily="34" charset="0"/>
               </a:rPr>
-              <a:t>Model Blueprint &amp; Data Pipeline</a:t>
-            </a:r>
-          </a:p>
-        </p:txBody>
-      </p:sp>
-      <p:pic>
-        <p:nvPicPr>
-          <p:cNvPr id="8" name="Picture 7">
-            <a:extLst>
-              <a:ext uri="{FF2B5EF4-FFF2-40B4-BE49-F238E27FC236}">
-                <a16:creationId xmlns:a16="http://schemas.microsoft.com/office/drawing/2014/main" id="{1D1651B4-B1E6-9FBF-B6CB-CDF33F44B993}"/>
-              </a:ext>
-            </a:extLst>
-          </p:cNvPr>
-          <p:cNvPicPr>
-            <a:picLocks noChangeAspect="1"/>
-          </p:cNvPicPr>
-          <p:nvPr/>
-        </p:nvPicPr>
-        <p:blipFill>
-          <a:blip r:embed="rId2"/>
-          <a:stretch>
-            <a:fillRect/>
-          </a:stretch>
-        </p:blipFill>
-        <p:spPr>
-          <a:xfrm>
-            <a:off x="554161" y="3258625"/>
-            <a:ext cx="934829" cy="340749"/>
-          </a:xfrm>
-          <a:prstGeom prst="rect">
-            <a:avLst/>
-          </a:prstGeom>
-        </p:spPr>
-      </p:pic>
-      <p:pic>
-        <p:nvPicPr>
-          <p:cNvPr id="10" name="Picture 9">
-            <a:extLst>
-              <a:ext uri="{FF2B5EF4-FFF2-40B4-BE49-F238E27FC236}">
-                <a16:creationId xmlns:a16="http://schemas.microsoft.com/office/drawing/2014/main" id="{CABA7063-8192-7A22-A4B0-A755941A6BAA}"/>
-              </a:ext>
-            </a:extLst>
-          </p:cNvPr>
-          <p:cNvPicPr>
-            <a:picLocks noChangeAspect="1"/>
-          </p:cNvPicPr>
-          <p:nvPr/>
-        </p:nvPicPr>
-        <p:blipFill rotWithShape="1">
-          <a:blip r:embed="rId3"/>
-          <a:srcRect l="6449" r="2297"/>
-          <a:stretch/>
-        </p:blipFill>
-        <p:spPr>
-          <a:xfrm>
-            <a:off x="496975" y="3663779"/>
-            <a:ext cx="1042988" cy="549876"/>
-          </a:xfrm>
-          <a:prstGeom prst="rect">
-            <a:avLst/>
-          </a:prstGeom>
-        </p:spPr>
-      </p:pic>
+              <a:t>Project Blueprint &amp; Data Pipeline</a:t>
+            </a:r>
+          </a:p>
+        </p:txBody>
+      </p:sp>
       <p:cxnSp>
         <p:nvCxnSpPr>
           <p:cNvPr id="12" name="Straight Arrow Connector 11">
@@ -5300,7 +5290,7 @@
         </p:nvCxnSpPr>
         <p:spPr>
           <a:xfrm>
-            <a:off x="1589942" y="3663779"/>
+            <a:off x="2170211" y="3556639"/>
             <a:ext cx="838161" cy="0"/>
           </a:xfrm>
           <a:prstGeom prst="straightConnector1">
@@ -5339,7 +5329,7 @@
         </p:nvSpPr>
         <p:spPr>
           <a:xfrm>
-            <a:off x="1650676" y="3449504"/>
+            <a:off x="2203404" y="3338866"/>
             <a:ext cx="716692" cy="261610"/>
           </a:xfrm>
           <a:prstGeom prst="rect">
@@ -5366,49 +5356,10 @@
       </p:sp>
       <p:sp>
         <p:nvSpPr>
-          <p:cNvPr id="17" name="TextBox 16">
-            <a:extLst>
-              <a:ext uri="{FF2B5EF4-FFF2-40B4-BE49-F238E27FC236}">
-                <a16:creationId xmlns:a16="http://schemas.microsoft.com/office/drawing/2014/main" id="{EE2F64A9-61E7-4EEC-2193-22694A0BCCB1}"/>
-              </a:ext>
-            </a:extLst>
-          </p:cNvPr>
-          <p:cNvSpPr txBox="1"/>
-          <p:nvPr/>
-        </p:nvSpPr>
-        <p:spPr>
-          <a:xfrm>
-            <a:off x="660123" y="2303978"/>
-            <a:ext cx="716692" cy="261610"/>
-          </a:xfrm>
-          <a:prstGeom prst="rect">
-            <a:avLst/>
-          </a:prstGeom>
-          <a:noFill/>
-        </p:spPr>
-        <p:txBody>
-          <a:bodyPr wrap="square" rtlCol="0">
-            <a:spAutoFit/>
-          </a:bodyPr>
-          <a:lstStyle/>
-          <a:p>
-            <a:pPr algn="ctr"/>
-            <a:r>
-              <a:rPr lang="en-US" sz="1100" dirty="0">
-                <a:latin typeface="Arial" panose="020B0604020202020204" pitchFamily="34" charset="0"/>
-                <a:cs typeface="Arial" panose="020B0604020202020204" pitchFamily="34" charset="0"/>
-              </a:rPr>
-              <a:t>API</a:t>
-            </a:r>
-          </a:p>
-        </p:txBody>
-      </p:sp>
-      <p:sp>
-        <p:nvSpPr>
-          <p:cNvPr id="18" name="Rectangle 17">
-            <a:extLst>
-              <a:ext uri="{FF2B5EF4-FFF2-40B4-BE49-F238E27FC236}">
-                <a16:creationId xmlns:a16="http://schemas.microsoft.com/office/drawing/2014/main" id="{5DC6186A-D078-B605-2FE9-7902C52D3DE0}"/>
+          <p:cNvPr id="38" name="Rectangle 37">
+            <a:extLst>
+              <a:ext uri="{FF2B5EF4-FFF2-40B4-BE49-F238E27FC236}">
+                <a16:creationId xmlns:a16="http://schemas.microsoft.com/office/drawing/2014/main" id="{45C915EF-AB8B-3B5F-7F4F-09AAA8D5C5A3}"/>
               </a:ext>
             </a:extLst>
           </p:cNvPr>
@@ -5417,8 +5368,8 @@
         </p:nvSpPr>
         <p:spPr>
           <a:xfrm>
-            <a:off x="2475212" y="2303978"/>
-            <a:ext cx="6792356" cy="3534590"/>
+            <a:off x="8888660" y="2795856"/>
+            <a:ext cx="1859756" cy="1767907"/>
           </a:xfrm>
           <a:prstGeom prst="rect">
             <a:avLst/>
@@ -5455,6 +5406,100 @@
           </a:p>
         </p:txBody>
       </p:sp>
+      <p:sp>
+        <p:nvSpPr>
+          <p:cNvPr id="17" name="TextBox 16">
+            <a:extLst>
+              <a:ext uri="{FF2B5EF4-FFF2-40B4-BE49-F238E27FC236}">
+                <a16:creationId xmlns:a16="http://schemas.microsoft.com/office/drawing/2014/main" id="{EE2F64A9-61E7-4EEC-2193-22694A0BCCB1}"/>
+              </a:ext>
+            </a:extLst>
+          </p:cNvPr>
+          <p:cNvSpPr txBox="1"/>
+          <p:nvPr/>
+        </p:nvSpPr>
+        <p:spPr>
+          <a:xfrm>
+            <a:off x="1240392" y="2075408"/>
+            <a:ext cx="716692" cy="261610"/>
+          </a:xfrm>
+          <a:prstGeom prst="rect">
+            <a:avLst/>
+          </a:prstGeom>
+          <a:noFill/>
+        </p:spPr>
+        <p:txBody>
+          <a:bodyPr wrap="square" rtlCol="0">
+            <a:spAutoFit/>
+          </a:bodyPr>
+          <a:lstStyle/>
+          <a:p>
+            <a:pPr algn="ctr"/>
+            <a:r>
+              <a:rPr lang="en-US" sz="1100" dirty="0">
+                <a:latin typeface="Arial" panose="020B0604020202020204" pitchFamily="34" charset="0"/>
+                <a:cs typeface="Arial" panose="020B0604020202020204" pitchFamily="34" charset="0"/>
+              </a:rPr>
+              <a:t>API</a:t>
+            </a:r>
+          </a:p>
+        </p:txBody>
+      </p:sp>
+      <p:sp>
+        <p:nvSpPr>
+          <p:cNvPr id="18" name="Rectangle 17">
+            <a:extLst>
+              <a:ext uri="{FF2B5EF4-FFF2-40B4-BE49-F238E27FC236}">
+                <a16:creationId xmlns:a16="http://schemas.microsoft.com/office/drawing/2014/main" id="{5DC6186A-D078-B605-2FE9-7902C52D3DE0}"/>
+              </a:ext>
+            </a:extLst>
+          </p:cNvPr>
+          <p:cNvSpPr/>
+          <p:nvPr/>
+        </p:nvSpPr>
+        <p:spPr>
+          <a:xfrm>
+            <a:off x="3018932" y="1828243"/>
+            <a:ext cx="5124169" cy="3534590"/>
+          </a:xfrm>
+          <a:prstGeom prst="rect">
+            <a:avLst/>
+          </a:prstGeom>
+          <a:solidFill>
+            <a:schemeClr val="bg1"/>
+          </a:solidFill>
+          <a:ln>
+            <a:prstDash val="dash"/>
+          </a:ln>
+        </p:spPr>
+        <p:style>
+          <a:lnRef idx="2">
+            <a:schemeClr val="accent3">
+              <a:shade val="15000"/>
+            </a:schemeClr>
+          </a:lnRef>
+          <a:fillRef idx="1">
+            <a:schemeClr val="accent3"/>
+          </a:fillRef>
+          <a:effectRef idx="0">
+            <a:schemeClr val="accent3"/>
+          </a:effectRef>
+          <a:fontRef idx="minor">
+            <a:schemeClr val="lt1"/>
+          </a:fontRef>
+        </p:style>
+        <p:txBody>
+          <a:bodyPr rtlCol="0" anchor="ctr"/>
+          <a:lstStyle/>
+          <a:p>
+            <a:pPr algn="ctr"/>
+            <a:endParaRPr lang="en-US" sz="2800" b="1" dirty="0">
+              <a:latin typeface="Arial" panose="020B0604020202020204" pitchFamily="34" charset="0"/>
+              <a:cs typeface="Arial" panose="020B0604020202020204" pitchFamily="34" charset="0"/>
+            </a:endParaRPr>
+          </a:p>
+        </p:txBody>
+      </p:sp>
       <p:pic>
         <p:nvPicPr>
           <p:cNvPr id="20" name="Picture 19">
@@ -5470,14 +5515,14 @@
           <p:nvPr/>
         </p:nvPicPr>
         <p:blipFill rotWithShape="1">
-          <a:blip r:embed="rId4"/>
+          <a:blip r:embed="rId2"/>
           <a:srcRect t="13640"/>
           <a:stretch/>
         </p:blipFill>
         <p:spPr>
           <a:xfrm>
-            <a:off x="2634885" y="2464082"/>
-            <a:ext cx="747739" cy="203012"/>
+            <a:off x="3178582" y="1946295"/>
+            <a:ext cx="863965" cy="234567"/>
           </a:xfrm>
           <a:prstGeom prst="rect">
             <a:avLst/>
@@ -5486,40 +5531,306 @@
       </p:pic>
       <p:pic>
         <p:nvPicPr>
-          <p:cNvPr id="22" name="Picture 21">
-            <a:extLst>
-              <a:ext uri="{FF2B5EF4-FFF2-40B4-BE49-F238E27FC236}">
-                <a16:creationId xmlns:a16="http://schemas.microsoft.com/office/drawing/2014/main" id="{C749CFA2-2A73-AE0D-A852-B76C46734319}"/>
+          <p:cNvPr id="2050" name="Picture 2" descr="NBA Logo and symbol, meaning, history, PNG, brand">
+            <a:extLst>
+              <a:ext uri="{FF2B5EF4-FFF2-40B4-BE49-F238E27FC236}">
+                <a16:creationId xmlns:a16="http://schemas.microsoft.com/office/drawing/2014/main" id="{18C1C528-8D47-07D0-D1E6-19602942B1B7}"/>
               </a:ext>
             </a:extLst>
           </p:cNvPr>
           <p:cNvPicPr>
-            <a:picLocks noChangeAspect="1"/>
+            <a:picLocks noChangeAspect="1" noChangeArrowheads="1"/>
+          </p:cNvPicPr>
+          <p:nvPr/>
+        </p:nvPicPr>
+        <p:blipFill rotWithShape="1">
+          <a:blip r:embed="rId3">
+            <a:extLst>
+              <a:ext uri="{28A0092B-C50C-407E-A947-70E740481C1C}">
+                <a14:useLocalDpi xmlns:a14="http://schemas.microsoft.com/office/drawing/2010/main" val="0"/>
+              </a:ext>
+            </a:extLst>
+          </a:blip>
+          <a:srcRect l="31845" r="32666"/>
+          <a:stretch/>
+        </p:blipFill>
+        <p:spPr bwMode="auto">
+          <a:xfrm>
+            <a:off x="1286749" y="2457468"/>
+            <a:ext cx="604542" cy="894271"/>
+          </a:xfrm>
+          <a:prstGeom prst="rect">
+            <a:avLst/>
+          </a:prstGeom>
+          <a:noFill/>
+          <a:extLst>
+            <a:ext uri="{909E8E84-426E-40DD-AFC4-6F175D3DCCD1}">
+              <a14:hiddenFill xmlns:a14="http://schemas.microsoft.com/office/drawing/2010/main">
+                <a:solidFill>
+                  <a:srgbClr val="FFFFFF"/>
+                </a:solidFill>
+              </a14:hiddenFill>
+            </a:ext>
+          </a:extLst>
+        </p:spPr>
+      </p:pic>
+      <p:pic>
+        <p:nvPicPr>
+          <p:cNvPr id="2052" name="Picture 4" descr="Basketball Reference (@bball_ref) / X">
+            <a:extLst>
+              <a:ext uri="{FF2B5EF4-FFF2-40B4-BE49-F238E27FC236}">
+                <a16:creationId xmlns:a16="http://schemas.microsoft.com/office/drawing/2014/main" id="{2E621B5B-328F-8F07-13CC-54858B410DFE}"/>
+              </a:ext>
+            </a:extLst>
+          </p:cNvPr>
+          <p:cNvPicPr>
+            <a:picLocks noChangeAspect="1" noChangeArrowheads="1"/>
           </p:cNvPicPr>
           <p:nvPr/>
         </p:nvPicPr>
         <p:blipFill>
-          <a:blip r:embed="rId5"/>
+          <a:blip r:embed="rId4">
+            <a:extLst>
+              <a:ext uri="{28A0092B-C50C-407E-A947-70E740481C1C}">
+                <a14:useLocalDpi xmlns:a14="http://schemas.microsoft.com/office/drawing/2010/main" val="0"/>
+              </a:ext>
+            </a:extLst>
+          </a:blip>
+          <a:srcRect/>
           <a:stretch>
             <a:fillRect/>
           </a:stretch>
         </p:blipFill>
-        <p:spPr>
-          <a:xfrm>
-            <a:off x="6274377" y="2501994"/>
-            <a:ext cx="1374455" cy="310705"/>
+        <p:spPr bwMode="auto">
+          <a:xfrm>
+            <a:off x="1303526" y="3544282"/>
+            <a:ext cx="570987" cy="570987"/>
           </a:xfrm>
           <a:prstGeom prst="rect">
             <a:avLst/>
           </a:prstGeom>
+          <a:noFill/>
+          <a:extLst>
+            <a:ext uri="{909E8E84-426E-40DD-AFC4-6F175D3DCCD1}">
+              <a14:hiddenFill xmlns:a14="http://schemas.microsoft.com/office/drawing/2010/main">
+                <a:solidFill>
+                  <a:srgbClr val="FFFFFF"/>
+                </a:solidFill>
+              </a14:hiddenFill>
+            </a:ext>
+          </a:extLst>
         </p:spPr>
       </p:pic>
+      <p:sp>
+        <p:nvSpPr>
+          <p:cNvPr id="11" name="TextBox 10">
+            <a:extLst>
+              <a:ext uri="{FF2B5EF4-FFF2-40B4-BE49-F238E27FC236}">
+                <a16:creationId xmlns:a16="http://schemas.microsoft.com/office/drawing/2014/main" id="{FBA223D9-AD8C-3004-8254-F2EBCD6D45B5}"/>
+              </a:ext>
+            </a:extLst>
+          </p:cNvPr>
+          <p:cNvSpPr txBox="1"/>
+          <p:nvPr/>
+        </p:nvSpPr>
+        <p:spPr>
+          <a:xfrm>
+            <a:off x="1163559" y="4115269"/>
+            <a:ext cx="850921" cy="400110"/>
+          </a:xfrm>
+          <a:prstGeom prst="rect">
+            <a:avLst/>
+          </a:prstGeom>
+          <a:noFill/>
+        </p:spPr>
+        <p:txBody>
+          <a:bodyPr wrap="square" rtlCol="0">
+            <a:spAutoFit/>
+          </a:bodyPr>
+          <a:lstStyle/>
+          <a:p>
+            <a:pPr algn="ctr"/>
+            <a:r>
+              <a:rPr lang="en-US" sz="1000" dirty="0">
+                <a:latin typeface="Arial" panose="020B0604020202020204" pitchFamily="34" charset="0"/>
+                <a:cs typeface="Arial" panose="020B0604020202020204" pitchFamily="34" charset="0"/>
+              </a:rPr>
+              <a:t>Basketball</a:t>
+            </a:r>
+          </a:p>
+          <a:p>
+            <a:pPr algn="ctr"/>
+            <a:r>
+              <a:rPr lang="en-US" sz="1000" dirty="0">
+                <a:latin typeface="Arial" panose="020B0604020202020204" pitchFamily="34" charset="0"/>
+                <a:cs typeface="Arial" panose="020B0604020202020204" pitchFamily="34" charset="0"/>
+              </a:rPr>
+              <a:t>Reference</a:t>
+            </a:r>
+          </a:p>
+        </p:txBody>
+      </p:sp>
+      <p:sp>
+        <p:nvSpPr>
+          <p:cNvPr id="15" name="Rectangle 14">
+            <a:extLst>
+              <a:ext uri="{FF2B5EF4-FFF2-40B4-BE49-F238E27FC236}">
+                <a16:creationId xmlns:a16="http://schemas.microsoft.com/office/drawing/2014/main" id="{57FB5B27-F320-5205-A6B7-DAD5620A46AE}"/>
+              </a:ext>
+            </a:extLst>
+          </p:cNvPr>
+          <p:cNvSpPr/>
+          <p:nvPr/>
+        </p:nvSpPr>
+        <p:spPr>
+          <a:xfrm>
+            <a:off x="4728083" y="2780724"/>
+            <a:ext cx="2643237" cy="2299791"/>
+          </a:xfrm>
+          <a:prstGeom prst="rect">
+            <a:avLst/>
+          </a:prstGeom>
+          <a:solidFill>
+            <a:schemeClr val="bg1"/>
+          </a:solidFill>
+        </p:spPr>
+        <p:style>
+          <a:lnRef idx="2">
+            <a:schemeClr val="accent3">
+              <a:shade val="15000"/>
+            </a:schemeClr>
+          </a:lnRef>
+          <a:fillRef idx="1">
+            <a:schemeClr val="accent3"/>
+          </a:fillRef>
+          <a:effectRef idx="0">
+            <a:schemeClr val="accent3"/>
+          </a:effectRef>
+          <a:fontRef idx="minor">
+            <a:schemeClr val="lt1"/>
+          </a:fontRef>
+        </p:style>
+        <p:txBody>
+          <a:bodyPr rtlCol="0" anchor="ctr"/>
+          <a:lstStyle/>
+          <a:p>
+            <a:pPr algn="ctr"/>
+            <a:endParaRPr lang="en-US" sz="2800" b="1" dirty="0">
+              <a:latin typeface="Arial" panose="020B0604020202020204" pitchFamily="34" charset="0"/>
+              <a:cs typeface="Arial" panose="020B0604020202020204" pitchFamily="34" charset="0"/>
+            </a:endParaRPr>
+          </a:p>
+        </p:txBody>
+      </p:sp>
+      <p:grpSp>
+        <p:nvGrpSpPr>
+          <p:cNvPr id="19" name="Group 18">
+            <a:extLst>
+              <a:ext uri="{FF2B5EF4-FFF2-40B4-BE49-F238E27FC236}">
+                <a16:creationId xmlns:a16="http://schemas.microsoft.com/office/drawing/2014/main" id="{E58FFF5D-69FA-F730-0E57-DF5BA5D643B7}"/>
+              </a:ext>
+            </a:extLst>
+          </p:cNvPr>
+          <p:cNvGrpSpPr/>
+          <p:nvPr/>
+        </p:nvGrpSpPr>
+        <p:grpSpPr>
+          <a:xfrm>
+            <a:off x="5286882" y="3620515"/>
+            <a:ext cx="1525637" cy="647699"/>
+            <a:chOff x="4818013" y="3835401"/>
+            <a:chExt cx="1525637" cy="647699"/>
+          </a:xfrm>
+        </p:grpSpPr>
+        <p:sp>
+          <p:nvSpPr>
+            <p:cNvPr id="14" name="Rectangle 13">
+              <a:extLst>
+                <a:ext uri="{FF2B5EF4-FFF2-40B4-BE49-F238E27FC236}">
+                  <a16:creationId xmlns:a16="http://schemas.microsoft.com/office/drawing/2014/main" id="{FB262A99-C6F6-FD59-D0C5-CCA89CB9123D}"/>
+                </a:ext>
+              </a:extLst>
+            </p:cNvPr>
+            <p:cNvSpPr/>
+            <p:nvPr/>
+          </p:nvSpPr>
+          <p:spPr>
+            <a:xfrm>
+              <a:off x="4818013" y="3835401"/>
+              <a:ext cx="1525637" cy="647699"/>
+            </a:xfrm>
+            <a:prstGeom prst="rect">
+              <a:avLst/>
+            </a:prstGeom>
+            <a:solidFill>
+              <a:schemeClr val="bg1"/>
+            </a:solidFill>
+          </p:spPr>
+          <p:style>
+            <a:lnRef idx="2">
+              <a:schemeClr val="accent3">
+                <a:shade val="15000"/>
+              </a:schemeClr>
+            </a:lnRef>
+            <a:fillRef idx="1">
+              <a:schemeClr val="accent3"/>
+            </a:fillRef>
+            <a:effectRef idx="0">
+              <a:schemeClr val="accent3"/>
+            </a:effectRef>
+            <a:fontRef idx="minor">
+              <a:schemeClr val="lt1"/>
+            </a:fontRef>
+          </p:style>
+          <p:txBody>
+            <a:bodyPr rtlCol="0" anchor="ctr"/>
+            <a:lstStyle/>
+            <a:p>
+              <a:pPr algn="ctr"/>
+              <a:endParaRPr lang="en-US" sz="2800" b="1" dirty="0">
+                <a:latin typeface="Arial" panose="020B0604020202020204" pitchFamily="34" charset="0"/>
+                <a:cs typeface="Arial" panose="020B0604020202020204" pitchFamily="34" charset="0"/>
+              </a:endParaRPr>
+            </a:p>
+          </p:txBody>
+        </p:sp>
+        <p:pic>
+          <p:nvPicPr>
+            <p:cNvPr id="22" name="Picture 21">
+              <a:extLst>
+                <a:ext uri="{FF2B5EF4-FFF2-40B4-BE49-F238E27FC236}">
+                  <a16:creationId xmlns:a16="http://schemas.microsoft.com/office/drawing/2014/main" id="{C749CFA2-2A73-AE0D-A852-B76C46734319}"/>
+                </a:ext>
+              </a:extLst>
+            </p:cNvPr>
+            <p:cNvPicPr>
+              <a:picLocks noChangeAspect="1"/>
+            </p:cNvPicPr>
+            <p:nvPr/>
+          </p:nvPicPr>
+          <p:blipFill>
+            <a:blip r:embed="rId5"/>
+            <a:stretch>
+              <a:fillRect/>
+            </a:stretch>
+          </p:blipFill>
+          <p:spPr>
+            <a:xfrm>
+              <a:off x="4893603" y="4003897"/>
+              <a:ext cx="1374455" cy="310705"/>
+            </a:xfrm>
+            <a:prstGeom prst="rect">
+              <a:avLst/>
+            </a:prstGeom>
+          </p:spPr>
+        </p:pic>
+      </p:grpSp>
       <p:pic>
         <p:nvPicPr>
-          <p:cNvPr id="24" name="Picture 23">
-            <a:extLst>
-              <a:ext uri="{FF2B5EF4-FFF2-40B4-BE49-F238E27FC236}">
-                <a16:creationId xmlns:a16="http://schemas.microsoft.com/office/drawing/2014/main" id="{AF784443-5030-2DA8-5A08-D14A9C49D505}"/>
+          <p:cNvPr id="7" name="Picture 6">
+            <a:extLst>
+              <a:ext uri="{FF2B5EF4-FFF2-40B4-BE49-F238E27FC236}">
+                <a16:creationId xmlns:a16="http://schemas.microsoft.com/office/drawing/2014/main" id="{E3327C92-39F7-2C78-160A-5EFE47498636}"/>
               </a:ext>
             </a:extLst>
           </p:cNvPr>
@@ -5536,20 +5847,220 @@
         </p:blipFill>
         <p:spPr>
           <a:xfrm>
-            <a:off x="10734029" y="2120055"/>
-            <a:ext cx="984007" cy="629456"/>
+            <a:off x="4803517" y="2880409"/>
+            <a:ext cx="889205" cy="373539"/>
           </a:xfrm>
           <a:prstGeom prst="rect">
             <a:avLst/>
           </a:prstGeom>
         </p:spPr>
       </p:pic>
+      <p:cxnSp>
+        <p:nvCxnSpPr>
+          <p:cNvPr id="23" name="Straight Connector 22">
+            <a:extLst>
+              <a:ext uri="{FF2B5EF4-FFF2-40B4-BE49-F238E27FC236}">
+                <a16:creationId xmlns:a16="http://schemas.microsoft.com/office/drawing/2014/main" id="{F5C77AD1-210F-A76E-69D5-94AF961A9392}"/>
+              </a:ext>
+            </a:extLst>
+          </p:cNvPr>
+          <p:cNvCxnSpPr/>
+          <p:nvPr/>
+        </p:nvCxnSpPr>
+        <p:spPr>
+          <a:xfrm flipV="1">
+            <a:off x="5362472" y="2457965"/>
+            <a:ext cx="0" cy="322759"/>
+          </a:xfrm>
+          <a:prstGeom prst="line">
+            <a:avLst/>
+          </a:prstGeom>
+        </p:spPr>
+        <p:style>
+          <a:lnRef idx="1">
+            <a:schemeClr val="dk1"/>
+          </a:lnRef>
+          <a:fillRef idx="0">
+            <a:schemeClr val="dk1"/>
+          </a:fillRef>
+          <a:effectRef idx="0">
+            <a:schemeClr val="dk1"/>
+          </a:effectRef>
+          <a:fontRef idx="minor">
+            <a:schemeClr val="tx1"/>
+          </a:fontRef>
+        </p:style>
+      </p:cxnSp>
+      <p:cxnSp>
+        <p:nvCxnSpPr>
+          <p:cNvPr id="27" name="Straight Connector 26">
+            <a:extLst>
+              <a:ext uri="{FF2B5EF4-FFF2-40B4-BE49-F238E27FC236}">
+                <a16:creationId xmlns:a16="http://schemas.microsoft.com/office/drawing/2014/main" id="{2C7F2BC4-76F5-A167-A562-E1D6A4941BDA}"/>
+              </a:ext>
+            </a:extLst>
+          </p:cNvPr>
+          <p:cNvCxnSpPr/>
+          <p:nvPr/>
+        </p:nvCxnSpPr>
+        <p:spPr>
+          <a:xfrm flipH="1">
+            <a:off x="4240770" y="2457965"/>
+            <a:ext cx="1121702" cy="0"/>
+          </a:xfrm>
+          <a:prstGeom prst="line">
+            <a:avLst/>
+          </a:prstGeom>
+        </p:spPr>
+        <p:style>
+          <a:lnRef idx="1">
+            <a:schemeClr val="dk1"/>
+          </a:lnRef>
+          <a:fillRef idx="0">
+            <a:schemeClr val="dk1"/>
+          </a:fillRef>
+          <a:effectRef idx="0">
+            <a:schemeClr val="dk1"/>
+          </a:effectRef>
+          <a:fontRef idx="minor">
+            <a:schemeClr val="tx1"/>
+          </a:fontRef>
+        </p:style>
+      </p:cxnSp>
+      <p:cxnSp>
+        <p:nvCxnSpPr>
+          <p:cNvPr id="29" name="Straight Connector 28">
+            <a:extLst>
+              <a:ext uri="{FF2B5EF4-FFF2-40B4-BE49-F238E27FC236}">
+                <a16:creationId xmlns:a16="http://schemas.microsoft.com/office/drawing/2014/main" id="{8C2615CA-5A0E-ED43-AE6E-01C4D29B3971}"/>
+              </a:ext>
+            </a:extLst>
+          </p:cNvPr>
+          <p:cNvCxnSpPr>
+            <a:cxnSpLocks/>
+          </p:cNvCxnSpPr>
+          <p:nvPr/>
+        </p:nvCxnSpPr>
+        <p:spPr>
+          <a:xfrm>
+            <a:off x="4240770" y="2457965"/>
+            <a:ext cx="0" cy="1479550"/>
+          </a:xfrm>
+          <a:prstGeom prst="line">
+            <a:avLst/>
+          </a:prstGeom>
+        </p:spPr>
+        <p:style>
+          <a:lnRef idx="1">
+            <a:schemeClr val="dk1"/>
+          </a:lnRef>
+          <a:fillRef idx="0">
+            <a:schemeClr val="dk1"/>
+          </a:fillRef>
+          <a:effectRef idx="0">
+            <a:schemeClr val="dk1"/>
+          </a:effectRef>
+          <a:fontRef idx="minor">
+            <a:schemeClr val="tx1"/>
+          </a:fontRef>
+        </p:style>
+      </p:cxnSp>
+      <p:cxnSp>
+        <p:nvCxnSpPr>
+          <p:cNvPr id="32" name="Straight Arrow Connector 31">
+            <a:extLst>
+              <a:ext uri="{FF2B5EF4-FFF2-40B4-BE49-F238E27FC236}">
+                <a16:creationId xmlns:a16="http://schemas.microsoft.com/office/drawing/2014/main" id="{8DAF1FF6-AB8B-3C55-3749-2572F495053B}"/>
+              </a:ext>
+            </a:extLst>
+          </p:cNvPr>
+          <p:cNvCxnSpPr>
+            <a:cxnSpLocks/>
+          </p:cNvCxnSpPr>
+          <p:nvPr/>
+        </p:nvCxnSpPr>
+        <p:spPr>
+          <a:xfrm flipV="1">
+            <a:off x="4240770" y="3932009"/>
+            <a:ext cx="1046112" cy="5850"/>
+          </a:xfrm>
+          <a:prstGeom prst="straightConnector1">
+            <a:avLst/>
+          </a:prstGeom>
+          <a:ln>
+            <a:tailEnd type="triangle"/>
+          </a:ln>
+        </p:spPr>
+        <p:style>
+          <a:lnRef idx="1">
+            <a:schemeClr val="dk1"/>
+          </a:lnRef>
+          <a:fillRef idx="0">
+            <a:schemeClr val="dk1"/>
+          </a:fillRef>
+          <a:effectRef idx="0">
+            <a:schemeClr val="dk1"/>
+          </a:effectRef>
+          <a:fontRef idx="minor">
+            <a:schemeClr val="tx1"/>
+          </a:fontRef>
+        </p:style>
+      </p:cxnSp>
+      <p:sp>
+        <p:nvSpPr>
+          <p:cNvPr id="33" name="TextBox 32">
+            <a:extLst>
+              <a:ext uri="{FF2B5EF4-FFF2-40B4-BE49-F238E27FC236}">
+                <a16:creationId xmlns:a16="http://schemas.microsoft.com/office/drawing/2014/main" id="{7DA25526-30B7-1456-DAB1-8461E7638481}"/>
+              </a:ext>
+            </a:extLst>
+          </p:cNvPr>
+          <p:cNvSpPr txBox="1"/>
+          <p:nvPr/>
+        </p:nvSpPr>
+        <p:spPr>
+          <a:xfrm>
+            <a:off x="4456681" y="2245425"/>
+            <a:ext cx="716692" cy="430887"/>
+          </a:xfrm>
+          <a:prstGeom prst="rect">
+            <a:avLst/>
+          </a:prstGeom>
+          <a:noFill/>
+        </p:spPr>
+        <p:txBody>
+          <a:bodyPr wrap="square" rtlCol="0">
+            <a:spAutoFit/>
+          </a:bodyPr>
+          <a:lstStyle/>
+          <a:p>
+            <a:pPr algn="ctr"/>
+            <a:r>
+              <a:rPr lang="en-US" sz="1100" dirty="0">
+                <a:latin typeface="Arial" panose="020B0604020202020204" pitchFamily="34" charset="0"/>
+                <a:cs typeface="Arial" panose="020B0604020202020204" pitchFamily="34" charset="0"/>
+              </a:rPr>
+              <a:t>Daily</a:t>
+            </a:r>
+          </a:p>
+          <a:p>
+            <a:pPr algn="ctr"/>
+            <a:r>
+              <a:rPr lang="en-US" sz="1100" dirty="0">
+                <a:latin typeface="Arial" panose="020B0604020202020204" pitchFamily="34" charset="0"/>
+                <a:cs typeface="Arial" panose="020B0604020202020204" pitchFamily="34" charset="0"/>
+              </a:rPr>
+              <a:t>Extract</a:t>
+            </a:r>
+          </a:p>
+        </p:txBody>
+      </p:sp>
       <p:pic>
         <p:nvPicPr>
-          <p:cNvPr id="26" name="Picture 25">
-            <a:extLst>
-              <a:ext uri="{FF2B5EF4-FFF2-40B4-BE49-F238E27FC236}">
-                <a16:creationId xmlns:a16="http://schemas.microsoft.com/office/drawing/2014/main" id="{651EAD75-E991-D691-DF16-17AFCE013453}"/>
+          <p:cNvPr id="3" name="Picture 2">
+            <a:extLst>
+              <a:ext uri="{FF2B5EF4-FFF2-40B4-BE49-F238E27FC236}">
+                <a16:creationId xmlns:a16="http://schemas.microsoft.com/office/drawing/2014/main" id="{D41F5AA0-F07E-4546-070F-F3181A7181D9}"/>
               </a:ext>
             </a:extLst>
           </p:cNvPr>
@@ -5566,8 +6077,8 @@
         </p:blipFill>
         <p:spPr>
           <a:xfrm>
-            <a:off x="8365660" y="5069458"/>
-            <a:ext cx="642416" cy="637304"/>
+            <a:off x="8736380" y="1988346"/>
+            <a:ext cx="1246078" cy="322398"/>
           </a:xfrm>
           <a:prstGeom prst="rect">
             <a:avLst/>
@@ -5576,40 +6087,55 @@
       </p:pic>
       <p:pic>
         <p:nvPicPr>
-          <p:cNvPr id="3" name="Picture 2">
-            <a:extLst>
-              <a:ext uri="{FF2B5EF4-FFF2-40B4-BE49-F238E27FC236}">
-                <a16:creationId xmlns:a16="http://schemas.microsoft.com/office/drawing/2014/main" id="{D41F5AA0-F07E-4546-070F-F3181A7181D9}"/>
+          <p:cNvPr id="2054" name="Picture 6" descr="Bar Graph Growth Animation Stock Footage Video (100% Royalty-free)  1027411775 | Shutterstock">
+            <a:extLst>
+              <a:ext uri="{FF2B5EF4-FFF2-40B4-BE49-F238E27FC236}">
+                <a16:creationId xmlns:a16="http://schemas.microsoft.com/office/drawing/2014/main" id="{49CB7546-2C89-7725-F2B0-41873BA8C216}"/>
               </a:ext>
             </a:extLst>
           </p:cNvPr>
           <p:cNvPicPr>
-            <a:picLocks noChangeAspect="1"/>
+            <a:picLocks noChangeAspect="1" noChangeArrowheads="1"/>
           </p:cNvPicPr>
           <p:nvPr/>
         </p:nvPicPr>
-        <p:blipFill>
-          <a:blip r:embed="rId8"/>
-          <a:stretch>
-            <a:fillRect/>
-          </a:stretch>
+        <p:blipFill rotWithShape="1">
+          <a:blip r:embed="rId8">
+            <a:extLst>
+              <a:ext uri="{28A0092B-C50C-407E-A947-70E740481C1C}">
+                <a14:useLocalDpi xmlns:a14="http://schemas.microsoft.com/office/drawing/2010/main" val="0"/>
+              </a:ext>
+            </a:extLst>
+          </a:blip>
+          <a:srcRect l="12268" r="8088"/>
+          <a:stretch/>
         </p:blipFill>
-        <p:spPr>
-          <a:xfrm>
-            <a:off x="10091529" y="6091881"/>
-            <a:ext cx="1869812" cy="483777"/>
+        <p:spPr bwMode="auto">
+          <a:xfrm>
+            <a:off x="8960365" y="2950400"/>
+            <a:ext cx="932124" cy="655403"/>
           </a:xfrm>
           <a:prstGeom prst="rect">
             <a:avLst/>
           </a:prstGeom>
+          <a:noFill/>
+          <a:extLst>
+            <a:ext uri="{909E8E84-426E-40DD-AFC4-6F175D3DCCD1}">
+              <a14:hiddenFill xmlns:a14="http://schemas.microsoft.com/office/drawing/2010/main">
+                <a:solidFill>
+                  <a:srgbClr val="FFFFFF"/>
+                </a:solidFill>
+              </a14:hiddenFill>
+            </a:ext>
+          </a:extLst>
         </p:spPr>
       </p:pic>
       <p:pic>
         <p:nvPicPr>
-          <p:cNvPr id="7" name="Picture 6">
-            <a:extLst>
-              <a:ext uri="{FF2B5EF4-FFF2-40B4-BE49-F238E27FC236}">
-                <a16:creationId xmlns:a16="http://schemas.microsoft.com/office/drawing/2014/main" id="{E3327C92-39F7-2C78-160A-5EFE47498636}"/>
+          <p:cNvPr id="37" name="Picture 36">
+            <a:extLst>
+              <a:ext uri="{FF2B5EF4-FFF2-40B4-BE49-F238E27FC236}">
+                <a16:creationId xmlns:a16="http://schemas.microsoft.com/office/drawing/2014/main" id="{2DA3B0D4-49DC-1C38-673B-96D7071383E9}"/>
               </a:ext>
             </a:extLst>
           </p:cNvPr>
@@ -5626,35 +6152,129 @@
         </p:blipFill>
         <p:spPr>
           <a:xfrm>
-            <a:off x="9482318" y="4137981"/>
-            <a:ext cx="2146049" cy="901517"/>
+            <a:off x="10011443" y="3020268"/>
+            <a:ext cx="541686" cy="508998"/>
           </a:xfrm>
           <a:prstGeom prst="rect">
             <a:avLst/>
           </a:prstGeom>
         </p:spPr>
       </p:pic>
-      <p:sp>
-        <p:nvSpPr>
-          <p:cNvPr id="9" name="TextBox 8">
-            <a:extLst>
-              <a:ext uri="{FF2B5EF4-FFF2-40B4-BE49-F238E27FC236}">
-                <a16:creationId xmlns:a16="http://schemas.microsoft.com/office/drawing/2014/main" id="{81122172-2C2B-137D-BD63-D811D0CA541A}"/>
-              </a:ext>
-            </a:extLst>
-          </p:cNvPr>
-          <p:cNvSpPr txBox="1"/>
+      <p:pic>
+        <p:nvPicPr>
+          <p:cNvPr id="2056" name="Picture 8" descr="Box and Whisker Plot 2D Animation | Animated Charts &amp; Graphs | GIFs">
+            <a:extLst>
+              <a:ext uri="{FF2B5EF4-FFF2-40B4-BE49-F238E27FC236}">
+                <a16:creationId xmlns:a16="http://schemas.microsoft.com/office/drawing/2014/main" id="{C8216E8A-B01D-5E8B-7D5C-D923AEAB7E02}"/>
+              </a:ext>
+            </a:extLst>
+          </p:cNvPr>
+          <p:cNvPicPr>
+            <a:picLocks noChangeAspect="1" noChangeArrowheads="1"/>
+          </p:cNvPicPr>
           <p:nvPr/>
-        </p:nvSpPr>
-        <p:spPr>
-          <a:xfrm>
-            <a:off x="4022954" y="6044514"/>
-            <a:ext cx="716692" cy="400110"/>
+        </p:nvPicPr>
+        <p:blipFill>
+          <a:blip r:embed="rId10">
+            <a:extLst>
+              <a:ext uri="{28A0092B-C50C-407E-A947-70E740481C1C}">
+                <a14:useLocalDpi xmlns:a14="http://schemas.microsoft.com/office/drawing/2010/main" val="0"/>
+              </a:ext>
+            </a:extLst>
+          </a:blip>
+          <a:srcRect/>
+          <a:stretch>
+            <a:fillRect/>
+          </a:stretch>
+        </p:blipFill>
+        <p:spPr bwMode="auto">
+          <a:xfrm>
+            <a:off x="8960364" y="3670338"/>
+            <a:ext cx="868017" cy="775029"/>
           </a:xfrm>
           <a:prstGeom prst="rect">
             <a:avLst/>
           </a:prstGeom>
           <a:noFill/>
+          <a:extLst>
+            <a:ext uri="{909E8E84-426E-40DD-AFC4-6F175D3DCCD1}">
+              <a14:hiddenFill xmlns:a14="http://schemas.microsoft.com/office/drawing/2010/main">
+                <a:solidFill>
+                  <a:srgbClr val="FFFFFF"/>
+                </a:solidFill>
+              </a14:hiddenFill>
+            </a:ext>
+          </a:extLst>
+        </p:spPr>
+      </p:pic>
+      <p:pic>
+        <p:nvPicPr>
+          <p:cNvPr id="2058" name="Picture 10" descr="Scatter Plot Diagram Chart Vector Illustration: เวกเตอร์สต็อก  (ปลอดค่าลิขสิทธิ์) 2038423901 | Shutterstock">
+            <a:extLst>
+              <a:ext uri="{FF2B5EF4-FFF2-40B4-BE49-F238E27FC236}">
+                <a16:creationId xmlns:a16="http://schemas.microsoft.com/office/drawing/2014/main" id="{A38A7ABA-5F95-3CA6-B874-907A46183AAA}"/>
+              </a:ext>
+            </a:extLst>
+          </p:cNvPr>
+          <p:cNvPicPr>
+            <a:picLocks noChangeAspect="1" noChangeArrowheads="1"/>
+          </p:cNvPicPr>
+          <p:nvPr/>
+        </p:nvPicPr>
+        <p:blipFill rotWithShape="1">
+          <a:blip r:embed="rId11">
+            <a:extLst>
+              <a:ext uri="{28A0092B-C50C-407E-A947-70E740481C1C}">
+                <a14:useLocalDpi xmlns:a14="http://schemas.microsoft.com/office/drawing/2010/main" val="0"/>
+              </a:ext>
+            </a:extLst>
+          </a:blip>
+          <a:srcRect l="9084" t="8860" r="9952" b="16001"/>
+          <a:stretch/>
+        </p:blipFill>
+        <p:spPr bwMode="auto">
+          <a:xfrm>
+            <a:off x="9892489" y="3670339"/>
+            <a:ext cx="775468" cy="775029"/>
+          </a:xfrm>
+          <a:prstGeom prst="rect">
+            <a:avLst/>
+          </a:prstGeom>
+          <a:noFill/>
+          <a:extLst>
+            <a:ext uri="{909E8E84-426E-40DD-AFC4-6F175D3DCCD1}">
+              <a14:hiddenFill xmlns:a14="http://schemas.microsoft.com/office/drawing/2010/main">
+                <a:solidFill>
+                  <a:srgbClr val="FFFFFF"/>
+                </a:solidFill>
+              </a14:hiddenFill>
+            </a:ext>
+          </a:extLst>
+        </p:spPr>
+      </p:pic>
+      <p:sp>
+        <p:nvSpPr>
+          <p:cNvPr id="39" name="TextBox 38">
+            <a:extLst>
+              <a:ext uri="{FF2B5EF4-FFF2-40B4-BE49-F238E27FC236}">
+                <a16:creationId xmlns:a16="http://schemas.microsoft.com/office/drawing/2014/main" id="{A08BCC46-AE07-6246-4BB9-F4BD3B8A1C3B}"/>
+              </a:ext>
+            </a:extLst>
+          </p:cNvPr>
+          <p:cNvSpPr txBox="1"/>
+          <p:nvPr/>
+        </p:nvSpPr>
+        <p:spPr>
+          <a:xfrm>
+            <a:off x="9274555" y="2635835"/>
+            <a:ext cx="1107652" cy="307777"/>
+          </a:xfrm>
+          <a:prstGeom prst="rect">
+            <a:avLst/>
+          </a:prstGeom>
+          <a:solidFill>
+            <a:schemeClr val="bg1"/>
+          </a:solidFill>
         </p:spPr>
         <p:txBody>
           <a:bodyPr wrap="square" rtlCol="0">
@@ -5664,12 +6284,198 @@
           <a:p>
             <a:pPr algn="ctr"/>
             <a:r>
-              <a:rPr lang="en-US" sz="1000" dirty="0">
+              <a:rPr lang="en-US" sz="1400" dirty="0">
                 <a:latin typeface="Arial" panose="020B0604020202020204" pitchFamily="34" charset="0"/>
                 <a:cs typeface="Arial" panose="020B0604020202020204" pitchFamily="34" charset="0"/>
               </a:rPr>
-              <a:t>Training Data</a:t>
-            </a:r>
+              <a:t>Dashboard</a:t>
+            </a:r>
+            <a:endParaRPr lang="en-US" sz="1100" dirty="0">
+              <a:latin typeface="Arial" panose="020B0604020202020204" pitchFamily="34" charset="0"/>
+              <a:cs typeface="Arial" panose="020B0604020202020204" pitchFamily="34" charset="0"/>
+            </a:endParaRPr>
+          </a:p>
+        </p:txBody>
+      </p:sp>
+      <p:cxnSp>
+        <p:nvCxnSpPr>
+          <p:cNvPr id="40" name="Straight Arrow Connector 39">
+            <a:extLst>
+              <a:ext uri="{FF2B5EF4-FFF2-40B4-BE49-F238E27FC236}">
+                <a16:creationId xmlns:a16="http://schemas.microsoft.com/office/drawing/2014/main" id="{5A7854B0-9BAA-EE94-1D70-8833A1B90AA3}"/>
+              </a:ext>
+            </a:extLst>
+          </p:cNvPr>
+          <p:cNvCxnSpPr>
+            <a:cxnSpLocks/>
+          </p:cNvCxnSpPr>
+          <p:nvPr/>
+        </p:nvCxnSpPr>
+        <p:spPr>
+          <a:xfrm>
+            <a:off x="7378374" y="4289131"/>
+            <a:ext cx="1510286" cy="0"/>
+          </a:xfrm>
+          <a:prstGeom prst="straightConnector1">
+            <a:avLst/>
+          </a:prstGeom>
+          <a:ln>
+            <a:tailEnd type="triangle"/>
+          </a:ln>
+        </p:spPr>
+        <p:style>
+          <a:lnRef idx="1">
+            <a:schemeClr val="dk1"/>
+          </a:lnRef>
+          <a:fillRef idx="0">
+            <a:schemeClr val="dk1"/>
+          </a:fillRef>
+          <a:effectRef idx="0">
+            <a:schemeClr val="dk1"/>
+          </a:effectRef>
+          <a:fontRef idx="minor">
+            <a:schemeClr val="tx1"/>
+          </a:fontRef>
+        </p:style>
+      </p:cxnSp>
+      <p:sp>
+        <p:nvSpPr>
+          <p:cNvPr id="41" name="TextBox 40">
+            <a:extLst>
+              <a:ext uri="{FF2B5EF4-FFF2-40B4-BE49-F238E27FC236}">
+                <a16:creationId xmlns:a16="http://schemas.microsoft.com/office/drawing/2014/main" id="{E3DC5577-D4C0-28E7-D861-AB1D1199C325}"/>
+              </a:ext>
+            </a:extLst>
+          </p:cNvPr>
+          <p:cNvSpPr txBox="1"/>
+          <p:nvPr/>
+        </p:nvSpPr>
+        <p:spPr>
+          <a:xfrm>
+            <a:off x="7647830" y="4306867"/>
+            <a:ext cx="892052" cy="276999"/>
+          </a:xfrm>
+          <a:prstGeom prst="rect">
+            <a:avLst/>
+          </a:prstGeom>
+          <a:solidFill>
+            <a:schemeClr val="bg1"/>
+          </a:solidFill>
+        </p:spPr>
+        <p:txBody>
+          <a:bodyPr wrap="square" rtlCol="0">
+            <a:spAutoFit/>
+          </a:bodyPr>
+          <a:lstStyle/>
+          <a:p>
+            <a:pPr algn="ctr"/>
+            <a:r>
+              <a:rPr lang="en-US" sz="1200" dirty="0">
+                <a:latin typeface="Arial" panose="020B0604020202020204" pitchFamily="34" charset="0"/>
+                <a:cs typeface="Arial" panose="020B0604020202020204" pitchFamily="34" charset="0"/>
+              </a:rPr>
+              <a:t>Publish</a:t>
+            </a:r>
+            <a:endParaRPr lang="en-US" sz="1000" dirty="0">
+              <a:latin typeface="Arial" panose="020B0604020202020204" pitchFamily="34" charset="0"/>
+              <a:cs typeface="Arial" panose="020B0604020202020204" pitchFamily="34" charset="0"/>
+            </a:endParaRPr>
+          </a:p>
+        </p:txBody>
+      </p:sp>
+      <p:cxnSp>
+        <p:nvCxnSpPr>
+          <p:cNvPr id="43" name="Straight Arrow Connector 42">
+            <a:extLst>
+              <a:ext uri="{FF2B5EF4-FFF2-40B4-BE49-F238E27FC236}">
+                <a16:creationId xmlns:a16="http://schemas.microsoft.com/office/drawing/2014/main" id="{36940F45-0321-F278-C5AC-43601D298983}"/>
+              </a:ext>
+            </a:extLst>
+          </p:cNvPr>
+          <p:cNvCxnSpPr>
+            <a:cxnSpLocks/>
+          </p:cNvCxnSpPr>
+          <p:nvPr/>
+        </p:nvCxnSpPr>
+        <p:spPr>
+          <a:xfrm flipH="1">
+            <a:off x="7371320" y="3367795"/>
+            <a:ext cx="1512599" cy="0"/>
+          </a:xfrm>
+          <a:prstGeom prst="straightConnector1">
+            <a:avLst/>
+          </a:prstGeom>
+          <a:ln>
+            <a:tailEnd type="triangle"/>
+          </a:ln>
+        </p:spPr>
+        <p:style>
+          <a:lnRef idx="1">
+            <a:schemeClr val="dk1"/>
+          </a:lnRef>
+          <a:fillRef idx="0">
+            <a:schemeClr val="dk1"/>
+          </a:fillRef>
+          <a:effectRef idx="0">
+            <a:schemeClr val="dk1"/>
+          </a:effectRef>
+          <a:fontRef idx="minor">
+            <a:schemeClr val="tx1"/>
+          </a:fontRef>
+        </p:style>
+      </p:cxnSp>
+      <p:sp>
+        <p:nvSpPr>
+          <p:cNvPr id="44" name="TextBox 43">
+            <a:extLst>
+              <a:ext uri="{FF2B5EF4-FFF2-40B4-BE49-F238E27FC236}">
+                <a16:creationId xmlns:a16="http://schemas.microsoft.com/office/drawing/2014/main" id="{F53C62BB-CD34-4A0A-CEB0-306D1AB3C3CF}"/>
+              </a:ext>
+            </a:extLst>
+          </p:cNvPr>
+          <p:cNvSpPr txBox="1"/>
+          <p:nvPr/>
+        </p:nvSpPr>
+        <p:spPr>
+          <a:xfrm>
+            <a:off x="7697076" y="2928040"/>
+            <a:ext cx="892052" cy="430887"/>
+          </a:xfrm>
+          <a:prstGeom prst="rect">
+            <a:avLst/>
+          </a:prstGeom>
+          <a:solidFill>
+            <a:schemeClr val="bg1"/>
+          </a:solidFill>
+        </p:spPr>
+        <p:txBody>
+          <a:bodyPr wrap="square" rtlCol="0">
+            <a:spAutoFit/>
+          </a:bodyPr>
+          <a:lstStyle/>
+          <a:p>
+            <a:pPr algn="ctr"/>
+            <a:r>
+              <a:rPr lang="en-US" sz="1100" dirty="0">
+                <a:latin typeface="Arial" panose="020B0604020202020204" pitchFamily="34" charset="0"/>
+                <a:cs typeface="Arial" panose="020B0604020202020204" pitchFamily="34" charset="0"/>
+              </a:rPr>
+              <a:t>Daily</a:t>
+            </a:r>
+          </a:p>
+          <a:p>
+            <a:pPr algn="ctr"/>
+            <a:r>
+              <a:rPr lang="en-US" sz="1100" dirty="0">
+                <a:latin typeface="Arial" panose="020B0604020202020204" pitchFamily="34" charset="0"/>
+                <a:cs typeface="Arial" panose="020B0604020202020204" pitchFamily="34" charset="0"/>
+              </a:rPr>
+              <a:t>Extract</a:t>
+            </a:r>
+            <a:endParaRPr lang="en-US" sz="1000" dirty="0">
+              <a:latin typeface="Arial" panose="020B0604020202020204" pitchFamily="34" charset="0"/>
+              <a:cs typeface="Arial" panose="020B0604020202020204" pitchFamily="34" charset="0"/>
+            </a:endParaRPr>
           </a:p>
         </p:txBody>
       </p:sp>
@@ -5677,6 +6483,149 @@
     <p:extLst>
       <p:ext uri="{BB962C8B-B14F-4D97-AF65-F5344CB8AC3E}">
         <p14:creationId xmlns:p14="http://schemas.microsoft.com/office/powerpoint/2010/main" val="152359631"/>
+      </p:ext>
+    </p:extLst>
+  </p:cSld>
+  <p:clrMapOvr>
+    <a:masterClrMapping/>
+  </p:clrMapOvr>
+</p:sld>
+</file>
+
+<file path=ppt/slides/slide3.xml><?xml version="1.0" encoding="utf-8"?>
+<p:sld xmlns:a="http://schemas.openxmlformats.org/drawingml/2006/main" xmlns:r="http://schemas.openxmlformats.org/officeDocument/2006/relationships" xmlns:p="http://schemas.openxmlformats.org/presentationml/2006/main">
+  <p:cSld>
+    <p:spTree>
+      <p:nvGrpSpPr>
+        <p:cNvPr id="1" name=""/>
+        <p:cNvGrpSpPr/>
+        <p:nvPr/>
+      </p:nvGrpSpPr>
+      <p:grpSpPr>
+        <a:xfrm>
+          <a:off x="0" y="0"/>
+          <a:ext cx="0" cy="0"/>
+          <a:chOff x="0" y="0"/>
+          <a:chExt cx="0" cy="0"/>
+        </a:xfrm>
+      </p:grpSpPr>
+      <p:pic>
+        <p:nvPicPr>
+          <p:cNvPr id="5" name="Picture 4" descr="A colorful gradient on a surface&#10;&#10;Description automatically generated with medium confidence">
+            <a:extLst>
+              <a:ext uri="{FF2B5EF4-FFF2-40B4-BE49-F238E27FC236}">
+                <a16:creationId xmlns:a16="http://schemas.microsoft.com/office/drawing/2014/main" id="{9C4A3CA5-2513-8C08-50ED-FD9CC4824D02}"/>
+              </a:ext>
+            </a:extLst>
+          </p:cNvPr>
+          <p:cNvPicPr>
+            <a:picLocks noChangeAspect="1"/>
+          </p:cNvPicPr>
+          <p:nvPr/>
+        </p:nvPicPr>
+        <p:blipFill>
+          <a:blip r:embed="rId2">
+            <a:alphaModFix amt="35000"/>
+            <a:extLst>
+              <a:ext uri="{BEBA8EAE-BF5A-486C-A8C5-ECC9F3942E4B}">
+                <a14:imgProps xmlns:a14="http://schemas.microsoft.com/office/drawing/2010/main">
+                  <a14:imgLayer r:embed="rId3">
+                    <a14:imgEffect>
+                      <a14:saturation sat="66000"/>
+                    </a14:imgEffect>
+                  </a14:imgLayer>
+                </a14:imgProps>
+              </a:ext>
+              <a:ext uri="{28A0092B-C50C-407E-A947-70E740481C1C}">
+                <a14:useLocalDpi xmlns:a14="http://schemas.microsoft.com/office/drawing/2010/main" val="0"/>
+              </a:ext>
+            </a:extLst>
+          </a:blip>
+          <a:stretch>
+            <a:fillRect/>
+          </a:stretch>
+        </p:blipFill>
+        <p:spPr>
+          <a:xfrm rot="10800000">
+            <a:off x="0" y="0"/>
+            <a:ext cx="12204880" cy="6858000"/>
+          </a:xfrm>
+          <a:prstGeom prst="rect">
+            <a:avLst/>
+          </a:prstGeom>
+        </p:spPr>
+      </p:pic>
+    </p:spTree>
+    <p:extLst>
+      <p:ext uri="{BB962C8B-B14F-4D97-AF65-F5344CB8AC3E}">
+        <p14:creationId xmlns:p14="http://schemas.microsoft.com/office/powerpoint/2010/main" val="492464143"/>
+      </p:ext>
+    </p:extLst>
+  </p:cSld>
+  <p:clrMapOvr>
+    <a:masterClrMapping/>
+  </p:clrMapOvr>
+</p:sld>
+</file>
+
+<file path=ppt/slides/slide4.xml><?xml version="1.0" encoding="utf-8"?>
+<p:sld xmlns:a="http://schemas.openxmlformats.org/drawingml/2006/main" xmlns:r="http://schemas.openxmlformats.org/officeDocument/2006/relationships" xmlns:p="http://schemas.openxmlformats.org/presentationml/2006/main">
+  <p:cSld>
+    <p:spTree>
+      <p:nvGrpSpPr>
+        <p:cNvPr id="1" name=""/>
+        <p:cNvGrpSpPr/>
+        <p:nvPr/>
+      </p:nvGrpSpPr>
+      <p:grpSpPr>
+        <a:xfrm>
+          <a:off x="0" y="0"/>
+          <a:ext cx="0" cy="0"/>
+          <a:chOff x="0" y="0"/>
+          <a:chExt cx="0" cy="0"/>
+        </a:xfrm>
+      </p:grpSpPr>
+      <p:pic>
+        <p:nvPicPr>
+          <p:cNvPr id="5" name="Picture 4" descr="A blue and pink gradient&#10;&#10;Description automatically generated">
+            <a:extLst>
+              <a:ext uri="{FF2B5EF4-FFF2-40B4-BE49-F238E27FC236}">
+                <a16:creationId xmlns:a16="http://schemas.microsoft.com/office/drawing/2014/main" id="{2C5CCDCC-391E-C5DA-2F57-B08E94FA8444}"/>
+              </a:ext>
+            </a:extLst>
+          </p:cNvPr>
+          <p:cNvPicPr>
+            <a:picLocks noChangeAspect="1"/>
+          </p:cNvPicPr>
+          <p:nvPr/>
+        </p:nvPicPr>
+        <p:blipFill>
+          <a:blip r:embed="rId2">
+            <a:alphaModFix amt="35000"/>
+            <a:extLst>
+              <a:ext uri="{28A0092B-C50C-407E-A947-70E740481C1C}">
+                <a14:useLocalDpi xmlns:a14="http://schemas.microsoft.com/office/drawing/2010/main" val="0"/>
+              </a:ext>
+            </a:extLst>
+          </a:blip>
+          <a:stretch>
+            <a:fillRect/>
+          </a:stretch>
+        </p:blipFill>
+        <p:spPr>
+          <a:xfrm>
+            <a:off x="0" y="0"/>
+            <a:ext cx="10636250" cy="6858000"/>
+          </a:xfrm>
+          <a:prstGeom prst="rect">
+            <a:avLst/>
+          </a:prstGeom>
+        </p:spPr>
+      </p:pic>
+    </p:spTree>
+    <p:extLst>
+      <p:ext uri="{BB962C8B-B14F-4D97-AF65-F5344CB8AC3E}">
+        <p14:creationId xmlns:p14="http://schemas.microsoft.com/office/powerpoint/2010/main" val="3932586909"/>
       </p:ext>
     </p:extLst>
   </p:cSld>

</xml_diff>